<commit_message>
pic updates and cb start
</commit_message>
<xml_diff>
--- a/ThumbnailSlide.pptx
+++ b/ThumbnailSlide.pptx
@@ -261,7 +261,7 @@
           <a:p>
             <a:fld id="{B63BB626-DC5D-4BBA-8BFD-47FD5F16A5BC}" type="datetimeFigureOut">
               <a:rPr lang="en-AU" smtClean="0"/>
-              <a:t>27/05/2022</a:t>
+              <a:t>24/08/2023</a:t>
             </a:fld>
             <a:endParaRPr lang="en-AU"/>
           </a:p>
@@ -461,7 +461,7 @@
           <a:p>
             <a:fld id="{B63BB626-DC5D-4BBA-8BFD-47FD5F16A5BC}" type="datetimeFigureOut">
               <a:rPr lang="en-AU" smtClean="0"/>
-              <a:t>27/05/2022</a:t>
+              <a:t>24/08/2023</a:t>
             </a:fld>
             <a:endParaRPr lang="en-AU"/>
           </a:p>
@@ -671,7 +671,7 @@
           <a:p>
             <a:fld id="{B63BB626-DC5D-4BBA-8BFD-47FD5F16A5BC}" type="datetimeFigureOut">
               <a:rPr lang="en-AU" smtClean="0"/>
-              <a:t>27/05/2022</a:t>
+              <a:t>24/08/2023</a:t>
             </a:fld>
             <a:endParaRPr lang="en-AU"/>
           </a:p>
@@ -871,7 +871,7 @@
           <a:p>
             <a:fld id="{B63BB626-DC5D-4BBA-8BFD-47FD5F16A5BC}" type="datetimeFigureOut">
               <a:rPr lang="en-AU" smtClean="0"/>
-              <a:t>27/05/2022</a:t>
+              <a:t>24/08/2023</a:t>
             </a:fld>
             <a:endParaRPr lang="en-AU"/>
           </a:p>
@@ -1147,7 +1147,7 @@
           <a:p>
             <a:fld id="{B63BB626-DC5D-4BBA-8BFD-47FD5F16A5BC}" type="datetimeFigureOut">
               <a:rPr lang="en-AU" smtClean="0"/>
-              <a:t>27/05/2022</a:t>
+              <a:t>24/08/2023</a:t>
             </a:fld>
             <a:endParaRPr lang="en-AU"/>
           </a:p>
@@ -1415,7 +1415,7 @@
           <a:p>
             <a:fld id="{B63BB626-DC5D-4BBA-8BFD-47FD5F16A5BC}" type="datetimeFigureOut">
               <a:rPr lang="en-AU" smtClean="0"/>
-              <a:t>27/05/2022</a:t>
+              <a:t>24/08/2023</a:t>
             </a:fld>
             <a:endParaRPr lang="en-AU"/>
           </a:p>
@@ -1830,7 +1830,7 @@
           <a:p>
             <a:fld id="{B63BB626-DC5D-4BBA-8BFD-47FD5F16A5BC}" type="datetimeFigureOut">
               <a:rPr lang="en-AU" smtClean="0"/>
-              <a:t>27/05/2022</a:t>
+              <a:t>24/08/2023</a:t>
             </a:fld>
             <a:endParaRPr lang="en-AU"/>
           </a:p>
@@ -1972,7 +1972,7 @@
           <a:p>
             <a:fld id="{B63BB626-DC5D-4BBA-8BFD-47FD5F16A5BC}" type="datetimeFigureOut">
               <a:rPr lang="en-AU" smtClean="0"/>
-              <a:t>27/05/2022</a:t>
+              <a:t>24/08/2023</a:t>
             </a:fld>
             <a:endParaRPr lang="en-AU"/>
           </a:p>
@@ -2085,7 +2085,7 @@
           <a:p>
             <a:fld id="{B63BB626-DC5D-4BBA-8BFD-47FD5F16A5BC}" type="datetimeFigureOut">
               <a:rPr lang="en-AU" smtClean="0"/>
-              <a:t>27/05/2022</a:t>
+              <a:t>24/08/2023</a:t>
             </a:fld>
             <a:endParaRPr lang="en-AU"/>
           </a:p>
@@ -2398,7 +2398,7 @@
           <a:p>
             <a:fld id="{B63BB626-DC5D-4BBA-8BFD-47FD5F16A5BC}" type="datetimeFigureOut">
               <a:rPr lang="en-AU" smtClean="0"/>
-              <a:t>27/05/2022</a:t>
+              <a:t>24/08/2023</a:t>
             </a:fld>
             <a:endParaRPr lang="en-AU"/>
           </a:p>
@@ -2687,7 +2687,7 @@
           <a:p>
             <a:fld id="{B63BB626-DC5D-4BBA-8BFD-47FD5F16A5BC}" type="datetimeFigureOut">
               <a:rPr lang="en-AU" smtClean="0"/>
-              <a:t>27/05/2022</a:t>
+              <a:t>24/08/2023</a:t>
             </a:fld>
             <a:endParaRPr lang="en-AU"/>
           </a:p>
@@ -2930,7 +2930,7 @@
           <a:p>
             <a:fld id="{B63BB626-DC5D-4BBA-8BFD-47FD5F16A5BC}" type="datetimeFigureOut">
               <a:rPr lang="en-AU" smtClean="0"/>
-              <a:t>27/05/2022</a:t>
+              <a:t>24/08/2023</a:t>
             </a:fld>
             <a:endParaRPr lang="en-AU"/>
           </a:p>
@@ -3491,28 +3491,8 @@
           </a:p>
           <a:p>
             <a:r>
-              <a:rPr lang="de-DE" sz="3600" b="1" dirty="0" err="1"/>
-              <a:t>From</a:t>
-            </a:r>
-            <a:r>
-              <a:rPr lang="de-DE" sz="3600" b="1" dirty="0"/>
-              <a:t> </a:t>
-            </a:r>
-            <a:r>
-              <a:rPr lang="de-DE" sz="3600" b="1" dirty="0" err="1"/>
-              <a:t>Tables</a:t>
-            </a:r>
-            <a:r>
-              <a:rPr lang="de-DE" sz="3600" b="1" dirty="0"/>
-              <a:t> </a:t>
-            </a:r>
-            <a:r>
-              <a:rPr lang="de-DE" sz="3600" b="1" dirty="0" err="1"/>
-              <a:t>to</a:t>
-            </a:r>
-            <a:r>
-              <a:rPr lang="de-DE" sz="3600" b="1" dirty="0"/>
-              <a:t> Forests</a:t>
+              <a:rPr lang="en-AU" sz="3600" b="1" dirty="0"/>
+              <a:t>Introduction to Dimension Reduction Methods with R</a:t>
             </a:r>
           </a:p>
           <a:p>
@@ -3546,8 +3526,12 @@
               <a:rPr lang="nb-NO" dirty="0"/>
             </a:br>
             <a:r>
-              <a:rPr lang="de-DE" dirty="0"/>
-              <a:t>June 10, 2022</a:t>
+              <a:rPr lang="nb-NO" dirty="0"/>
+              <a:t>August</a:t>
+            </a:r>
+            <a:r>
+              <a:rPr lang="de-DE"/>
+              <a:t> 25, 2025</a:t>
             </a:r>
             <a:endParaRPr lang="en-AU" dirty="0"/>
           </a:p>

</xml_diff>